<commit_message>
Fix changing picture source with shared image source
</commit_message>
<xml_diff>
--- a/ShapeCrawler.Tests.Unit/Resource/009.pptx
+++ b/ShapeCrawler.Tests.Unit/Resource/009.pptx
@@ -119,7 +119,7 @@
 <file path=ppt/charts/chart1.xml><?xml version="1.0" encoding="utf-8"?>
 <c:chartSpace xmlns:c="http://schemas.openxmlformats.org/drawingml/2006/chart" xmlns:a="http://schemas.openxmlformats.org/drawingml/2006/main" xmlns:r="http://schemas.openxmlformats.org/officeDocument/2006/relationships" xmlns:c16r2="http://schemas.microsoft.com/office/drawing/2015/06/chart">
   <c:date1904 val="0"/>
-  <c:lang val="ru-RU"/>
+  <c:lang val="en-US"/>
   <c:roundedCorners val="0"/>
   <mc:AlternateContent xmlns:mc="http://schemas.openxmlformats.org/markup-compatibility/2006">
     <mc:Choice xmlns:c14="http://schemas.microsoft.com/office/drawing/2007/8/2/chart" Requires="c14">
@@ -156,7 +156,7 @@
               <a:cs typeface="+mn-cs"/>
             </a:defRPr>
           </a:pPr>
-          <a:endParaRPr lang="ru-UA"/>
+          <a:endParaRPr lang="ru-RU"/>
         </a:p>
       </c:txPr>
     </c:title>
@@ -434,7 +434,7 @@
                 <a:cs typeface="+mn-cs"/>
               </a:defRPr>
             </a:pPr>
-            <a:endParaRPr lang="ru-UA"/>
+            <a:endParaRPr lang="ru-RU"/>
           </a:p>
         </c:txPr>
         <c:crossAx val="947864576"/>
@@ -493,7 +493,7 @@
                 <a:cs typeface="+mn-cs"/>
               </a:defRPr>
             </a:pPr>
-            <a:endParaRPr lang="ru-UA"/>
+            <a:endParaRPr lang="ru-RU"/>
           </a:p>
         </c:txPr>
         <c:crossAx val="947800784"/>
@@ -535,7 +535,7 @@
               <a:cs typeface="+mn-cs"/>
             </a:defRPr>
           </a:pPr>
-          <a:endParaRPr lang="ru-UA"/>
+          <a:endParaRPr lang="ru-RU"/>
         </a:p>
       </c:txPr>
     </c:legend>
@@ -564,7 +564,7 @@
       <a:pPr>
         <a:defRPr/>
       </a:pPr>
-      <a:endParaRPr lang="ru-UA"/>
+      <a:endParaRPr lang="ru-RU"/>
     </a:p>
   </c:txPr>
   <c:externalData r:id="rId3">
@@ -576,7 +576,7 @@
 <file path=ppt/charts/chart2.xml><?xml version="1.0" encoding="utf-8"?>
 <c:chartSpace xmlns:c="http://schemas.openxmlformats.org/drawingml/2006/chart" xmlns:a="http://schemas.openxmlformats.org/drawingml/2006/main" xmlns:r="http://schemas.openxmlformats.org/officeDocument/2006/relationships" xmlns:c16r2="http://schemas.microsoft.com/office/drawing/2015/06/chart">
   <c:date1904 val="0"/>
-  <c:lang val="ru-RU"/>
+  <c:lang val="en-US"/>
   <c:roundedCorners val="0"/>
   <mc:AlternateContent xmlns:mc="http://schemas.openxmlformats.org/markup-compatibility/2006">
     <mc:Choice xmlns:c14="http://schemas.microsoft.com/office/drawing/2007/8/2/chart" Requires="c14">
@@ -613,7 +613,7 @@
               <a:cs typeface="+mn-cs"/>
             </a:defRPr>
           </a:pPr>
-          <a:endParaRPr lang="ru-UA"/>
+          <a:endParaRPr lang="ru-RU"/>
         </a:p>
       </c:txPr>
     </c:title>
@@ -809,7 +809,7 @@
               <a:cs typeface="+mn-cs"/>
             </a:defRPr>
           </a:pPr>
-          <a:endParaRPr lang="ru-UA"/>
+          <a:endParaRPr lang="ru-RU"/>
         </a:p>
       </c:txPr>
     </c:legend>
@@ -838,7 +838,7 @@
       <a:pPr>
         <a:defRPr/>
       </a:pPr>
-      <a:endParaRPr lang="ru-UA"/>
+      <a:endParaRPr lang="ru-RU"/>
     </a:p>
   </c:txPr>
   <c:externalData r:id="rId3">
@@ -850,7 +850,7 @@
 <file path=ppt/charts/chart3.xml><?xml version="1.0" encoding="utf-8"?>
 <c:chartSpace xmlns:c="http://schemas.openxmlformats.org/drawingml/2006/chart" xmlns:a="http://schemas.openxmlformats.org/drawingml/2006/main" xmlns:r="http://schemas.openxmlformats.org/officeDocument/2006/relationships" xmlns:c16r2="http://schemas.microsoft.com/office/drawing/2015/06/chart">
   <c:date1904 val="0"/>
-  <c:lang val="ru-RU"/>
+  <c:lang val="en-US"/>
   <c:roundedCorners val="0"/>
   <mc:AlternateContent xmlns:mc="http://schemas.openxmlformats.org/markup-compatibility/2006">
     <mc:Choice xmlns:c14="http://schemas.microsoft.com/office/drawing/2007/8/2/chart" Requires="c14">
@@ -899,7 +899,7 @@
               <a:cs typeface="+mn-cs"/>
             </a:defRPr>
           </a:pPr>
-          <a:endParaRPr lang="ru-UA"/>
+          <a:endParaRPr lang="ru-RU"/>
         </a:p>
       </c:txPr>
     </c:title>
@@ -1110,7 +1110,7 @@
               <a:cs typeface="+mn-cs"/>
             </a:defRPr>
           </a:pPr>
-          <a:endParaRPr lang="ru-UA"/>
+          <a:endParaRPr lang="ru-RU"/>
         </a:p>
       </c:txPr>
     </c:legend>
@@ -1139,7 +1139,7 @@
       <a:pPr>
         <a:defRPr/>
       </a:pPr>
-      <a:endParaRPr lang="ru-UA"/>
+      <a:endParaRPr lang="ru-RU"/>
     </a:p>
   </c:txPr>
   <c:externalData r:id="rId4">
@@ -1151,7 +1151,7 @@
 <file path=ppt/charts/chart4.xml><?xml version="1.0" encoding="utf-8"?>
 <c:chartSpace xmlns:c="http://schemas.openxmlformats.org/drawingml/2006/chart" xmlns:a="http://schemas.openxmlformats.org/drawingml/2006/main" xmlns:r="http://schemas.openxmlformats.org/officeDocument/2006/relationships" xmlns:c16r2="http://schemas.microsoft.com/office/drawing/2015/06/chart">
   <c:date1904 val="0"/>
-  <c:lang val="ru-RU"/>
+  <c:lang val="en-US"/>
   <c:roundedCorners val="0"/>
   <mc:AlternateContent xmlns:mc="http://schemas.openxmlformats.org/markup-compatibility/2006">
     <mc:Choice xmlns:c14="http://schemas.microsoft.com/office/drawing/2007/8/2/chart" Requires="c14">
@@ -1214,7 +1214,7 @@
               <a:cs typeface="+mn-cs"/>
             </a:defRPr>
           </a:pPr>
-          <a:endParaRPr lang="ru-UA"/>
+          <a:endParaRPr lang="ru-RU"/>
         </a:p>
       </c:txPr>
     </c:title>
@@ -1410,7 +1410,7 @@
               <a:cs typeface="+mn-cs"/>
             </a:defRPr>
           </a:pPr>
-          <a:endParaRPr lang="ru-UA"/>
+          <a:endParaRPr lang="ru-RU"/>
         </a:p>
       </c:txPr>
     </c:legend>
@@ -1441,7 +1441,7 @@
       <a:pPr>
         <a:defRPr/>
       </a:pPr>
-      <a:endParaRPr lang="ru-UA"/>
+      <a:endParaRPr lang="ru-RU"/>
     </a:p>
   </c:txPr>
   <c:externalData r:id="rId3">
@@ -1453,7 +1453,7 @@
 <file path=ppt/charts/chart5.xml><?xml version="1.0" encoding="utf-8"?>
 <c:chartSpace xmlns:c="http://schemas.openxmlformats.org/drawingml/2006/chart" xmlns:a="http://schemas.openxmlformats.org/drawingml/2006/main" xmlns:r="http://schemas.openxmlformats.org/officeDocument/2006/relationships" xmlns:c16r2="http://schemas.microsoft.com/office/drawing/2015/06/chart">
   <c:date1904 val="0"/>
-  <c:lang val="ru-RU"/>
+  <c:lang val="en-US"/>
   <c:roundedCorners val="0"/>
   <mc:AlternateContent xmlns:mc="http://schemas.openxmlformats.org/markup-compatibility/2006">
     <mc:Choice xmlns:c14="http://schemas.microsoft.com/office/drawing/2007/8/2/chart" Requires="c14">
@@ -1490,7 +1490,7 @@
               <a:cs typeface="+mn-cs"/>
             </a:defRPr>
           </a:pPr>
-          <a:endParaRPr lang="ru-UA"/>
+          <a:endParaRPr lang="ru-RU"/>
         </a:p>
       </c:txPr>
     </c:title>
@@ -1712,7 +1712,7 @@
               <a:cs typeface="+mn-cs"/>
             </a:defRPr>
           </a:pPr>
-          <a:endParaRPr lang="ru-UA"/>
+          <a:endParaRPr lang="ru-RU"/>
         </a:p>
       </c:txPr>
     </c:legend>
@@ -1743,7 +1743,7 @@
       <a:pPr>
         <a:defRPr/>
       </a:pPr>
-      <a:endParaRPr lang="ru-UA"/>
+      <a:endParaRPr lang="ru-RU"/>
     </a:p>
   </c:txPr>
   <c:externalData r:id="rId3">
@@ -1755,7 +1755,7 @@
 <file path=ppt/charts/chart6.xml><?xml version="1.0" encoding="utf-8"?>
 <c:chartSpace xmlns:c="http://schemas.openxmlformats.org/drawingml/2006/chart" xmlns:a="http://schemas.openxmlformats.org/drawingml/2006/main" xmlns:r="http://schemas.openxmlformats.org/officeDocument/2006/relationships" xmlns:c16r2="http://schemas.microsoft.com/office/drawing/2015/06/chart">
   <c:date1904 val="0"/>
-  <c:lang val="ru-RU"/>
+  <c:lang val="en-US"/>
   <c:roundedCorners val="0"/>
   <mc:AlternateContent xmlns:mc="http://schemas.openxmlformats.org/markup-compatibility/2006">
     <mc:Choice xmlns:c14="http://schemas.microsoft.com/office/drawing/2007/8/2/chart" Requires="c14">
@@ -1818,7 +1818,7 @@
               <a:cs typeface="+mn-cs"/>
             </a:defRPr>
           </a:pPr>
-          <a:endParaRPr lang="ru-UA"/>
+          <a:endParaRPr lang="ru-RU"/>
         </a:p>
       </c:txPr>
     </c:title>
@@ -2145,7 +2145,7 @@
       <a:pPr>
         <a:defRPr/>
       </a:pPr>
-      <a:endParaRPr lang="ru-UA"/>
+      <a:endParaRPr lang="ru-RU"/>
     </a:p>
   </c:txPr>
   <c:externalData r:id="rId3">
@@ -8157,7 +8157,7 @@
           <p:nvPr/>
         </p:nvPicPr>
         <p:blipFill>
-          <a:blip r:embed="rId3">
+          <a:blip r:embed="rId2">
             <a:extLst>
               <a:ext uri="{28A0092B-C50C-407E-A947-70E740481C1C}">
                 <a14:useLocalDpi xmlns:a14="http://schemas.microsoft.com/office/drawing/2010/main" val="0"/>
@@ -8206,12 +8206,12 @@
           <a:graphicData uri="http://schemas.openxmlformats.org/presentationml/2006/ole">
             <mc:AlternateContent xmlns:mc="http://schemas.openxmlformats.org/markup-compatibility/2006">
               <mc:Choice xmlns:v="urn:schemas-microsoft-com:vml" Requires="v">
-                <p:oleObj spid="_x0000_s1086" name="Document" r:id="rId4" imgW="5940848" imgH="323743" progId="Word.Document.12">
+                <p:oleObj name="Document" r:id="rId3" imgW="5940848" imgH="323743" progId="Word.Document.12">
                   <p:embed/>
                 </p:oleObj>
               </mc:Choice>
               <mc:Fallback>
-                <p:oleObj name="Document" r:id="rId4" imgW="5940848" imgH="323743" progId="Word.Document.12">
+                <p:oleObj name="Document" r:id="rId3" imgW="5940848" imgH="323743" progId="Word.Document.12">
                   <p:embed/>
                   <p:pic>
                     <p:nvPicPr>
@@ -8222,7 +8222,7 @@
                       <p:nvPr/>
                     </p:nvPicPr>
                     <p:blipFill>
-                      <a:blip r:embed="rId5">
+                      <a:blip r:embed="rId4">
                         <a:extLst>
                           <a:ext uri="{28A0092B-C50C-407E-A947-70E740481C1C}">
                             <a14:useLocalDpi xmlns:a14="http://schemas.microsoft.com/office/drawing/2010/main" val="0"/>
@@ -8311,12 +8311,12 @@
           <a:graphicData uri="http://schemas.openxmlformats.org/presentationml/2006/ole">
             <mc:AlternateContent xmlns:mc="http://schemas.openxmlformats.org/markup-compatibility/2006">
               <mc:Choice xmlns:v="urn:schemas-microsoft-com:vml" Requires="v">
-                <p:oleObj spid="_x0000_s1087" name="Packager Shell Object" showAsIcon="1" r:id="rId6" imgW="485640" imgH="372960" progId="Package">
+                <p:oleObj name="Packager Shell Object" showAsIcon="1" r:id="rId5" imgW="485640" imgH="372960" progId="Package">
                   <p:embed/>
                 </p:oleObj>
               </mc:Choice>
               <mc:Fallback>
-                <p:oleObj name="Packager Shell Object" showAsIcon="1" r:id="rId6" imgW="485640" imgH="372960" progId="Package">
+                <p:oleObj name="Packager Shell Object" showAsIcon="1" r:id="rId5" imgW="485640" imgH="372960" progId="Package">
                   <p:embed/>
                   <p:pic>
                     <p:nvPicPr>
@@ -8331,7 +8331,7 @@
                       <p:nvPr/>
                     </p:nvPicPr>
                     <p:blipFill>
-                      <a:blip r:embed="rId7"/>
+                      <a:blip r:embed="rId6"/>
                       <a:stretch>
                         <a:fillRect/>
                       </a:stretch>
@@ -8897,6 +8897,78 @@
           </a:p>
         </p:txBody>
       </p:sp>
+      <p:pic>
+        <p:nvPicPr>
+          <p:cNvPr id="5" name="Picture 4" descr="A green and white sign&#10;&#10;Description automatically generated with low confidence">
+            <a:extLst>
+              <a:ext uri="{FF2B5EF4-FFF2-40B4-BE49-F238E27FC236}">
+                <a16:creationId xmlns:a16="http://schemas.microsoft.com/office/drawing/2014/main" id="{263A8C7A-EA90-4009-BD1D-8220FD7742B4}"/>
+              </a:ext>
+            </a:extLst>
+          </p:cNvPr>
+          <p:cNvPicPr>
+            <a:picLocks noChangeAspect="1"/>
+          </p:cNvPicPr>
+          <p:nvPr/>
+        </p:nvPicPr>
+        <p:blipFill>
+          <a:blip r:embed="rId2">
+            <a:extLst>
+              <a:ext uri="{28A0092B-C50C-407E-A947-70E740481C1C}">
+                <a14:useLocalDpi xmlns:a14="http://schemas.microsoft.com/office/drawing/2010/main" val="0"/>
+              </a:ext>
+            </a:extLst>
+          </a:blip>
+          <a:stretch>
+            <a:fillRect/>
+          </a:stretch>
+        </p:blipFill>
+        <p:spPr>
+          <a:xfrm>
+            <a:off x="3075358" y="223529"/>
+            <a:ext cx="1720007" cy="1720007"/>
+          </a:xfrm>
+          <a:prstGeom prst="rect">
+            <a:avLst/>
+          </a:prstGeom>
+        </p:spPr>
+      </p:pic>
+      <p:pic>
+        <p:nvPicPr>
+          <p:cNvPr id="6" name="Picture 5" descr="A green and white sign&#10;&#10;Description automatically generated with low confidence">
+            <a:extLst>
+              <a:ext uri="{FF2B5EF4-FFF2-40B4-BE49-F238E27FC236}">
+                <a16:creationId xmlns:a16="http://schemas.microsoft.com/office/drawing/2014/main" id="{FEAEF015-E325-4518-B2DD-46500E7051EB}"/>
+              </a:ext>
+            </a:extLst>
+          </p:cNvPr>
+          <p:cNvPicPr>
+            <a:picLocks noChangeAspect="1"/>
+          </p:cNvPicPr>
+          <p:nvPr/>
+        </p:nvPicPr>
+        <p:blipFill>
+          <a:blip r:embed="rId2">
+            <a:extLst>
+              <a:ext uri="{28A0092B-C50C-407E-A947-70E740481C1C}">
+                <a14:useLocalDpi xmlns:a14="http://schemas.microsoft.com/office/drawing/2010/main" val="0"/>
+              </a:ext>
+            </a:extLst>
+          </a:blip>
+          <a:stretch>
+            <a:fillRect/>
+          </a:stretch>
+        </p:blipFill>
+        <p:spPr>
+          <a:xfrm>
+            <a:off x="5020895" y="223529"/>
+            <a:ext cx="1720007" cy="1720007"/>
+          </a:xfrm>
+          <a:prstGeom prst="rect">
+            <a:avLst/>
+          </a:prstGeom>
+        </p:spPr>
+      </p:pic>
     </p:spTree>
     <p:extLst>
       <p:ext uri="{BB962C8B-B14F-4D97-AF65-F5344CB8AC3E}">

</xml_diff>

<commit_message>
Fix changing picture source with shared image source (#136)
</commit_message>
<xml_diff>
--- a/ShapeCrawler.Tests.Unit/Resource/009.pptx
+++ b/ShapeCrawler.Tests.Unit/Resource/009.pptx
@@ -119,7 +119,7 @@
 <file path=ppt/charts/chart1.xml><?xml version="1.0" encoding="utf-8"?>
 <c:chartSpace xmlns:c="http://schemas.openxmlformats.org/drawingml/2006/chart" xmlns:a="http://schemas.openxmlformats.org/drawingml/2006/main" xmlns:r="http://schemas.openxmlformats.org/officeDocument/2006/relationships" xmlns:c16r2="http://schemas.microsoft.com/office/drawing/2015/06/chart">
   <c:date1904 val="0"/>
-  <c:lang val="ru-RU"/>
+  <c:lang val="en-US"/>
   <c:roundedCorners val="0"/>
   <mc:AlternateContent xmlns:mc="http://schemas.openxmlformats.org/markup-compatibility/2006">
     <mc:Choice xmlns:c14="http://schemas.microsoft.com/office/drawing/2007/8/2/chart" Requires="c14">
@@ -156,7 +156,7 @@
               <a:cs typeface="+mn-cs"/>
             </a:defRPr>
           </a:pPr>
-          <a:endParaRPr lang="ru-UA"/>
+          <a:endParaRPr lang="ru-RU"/>
         </a:p>
       </c:txPr>
     </c:title>
@@ -434,7 +434,7 @@
                 <a:cs typeface="+mn-cs"/>
               </a:defRPr>
             </a:pPr>
-            <a:endParaRPr lang="ru-UA"/>
+            <a:endParaRPr lang="ru-RU"/>
           </a:p>
         </c:txPr>
         <c:crossAx val="947864576"/>
@@ -493,7 +493,7 @@
                 <a:cs typeface="+mn-cs"/>
               </a:defRPr>
             </a:pPr>
-            <a:endParaRPr lang="ru-UA"/>
+            <a:endParaRPr lang="ru-RU"/>
           </a:p>
         </c:txPr>
         <c:crossAx val="947800784"/>
@@ -535,7 +535,7 @@
               <a:cs typeface="+mn-cs"/>
             </a:defRPr>
           </a:pPr>
-          <a:endParaRPr lang="ru-UA"/>
+          <a:endParaRPr lang="ru-RU"/>
         </a:p>
       </c:txPr>
     </c:legend>
@@ -564,7 +564,7 @@
       <a:pPr>
         <a:defRPr/>
       </a:pPr>
-      <a:endParaRPr lang="ru-UA"/>
+      <a:endParaRPr lang="ru-RU"/>
     </a:p>
   </c:txPr>
   <c:externalData r:id="rId3">
@@ -576,7 +576,7 @@
 <file path=ppt/charts/chart2.xml><?xml version="1.0" encoding="utf-8"?>
 <c:chartSpace xmlns:c="http://schemas.openxmlformats.org/drawingml/2006/chart" xmlns:a="http://schemas.openxmlformats.org/drawingml/2006/main" xmlns:r="http://schemas.openxmlformats.org/officeDocument/2006/relationships" xmlns:c16r2="http://schemas.microsoft.com/office/drawing/2015/06/chart">
   <c:date1904 val="0"/>
-  <c:lang val="ru-RU"/>
+  <c:lang val="en-US"/>
   <c:roundedCorners val="0"/>
   <mc:AlternateContent xmlns:mc="http://schemas.openxmlformats.org/markup-compatibility/2006">
     <mc:Choice xmlns:c14="http://schemas.microsoft.com/office/drawing/2007/8/2/chart" Requires="c14">
@@ -613,7 +613,7 @@
               <a:cs typeface="+mn-cs"/>
             </a:defRPr>
           </a:pPr>
-          <a:endParaRPr lang="ru-UA"/>
+          <a:endParaRPr lang="ru-RU"/>
         </a:p>
       </c:txPr>
     </c:title>
@@ -809,7 +809,7 @@
               <a:cs typeface="+mn-cs"/>
             </a:defRPr>
           </a:pPr>
-          <a:endParaRPr lang="ru-UA"/>
+          <a:endParaRPr lang="ru-RU"/>
         </a:p>
       </c:txPr>
     </c:legend>
@@ -838,7 +838,7 @@
       <a:pPr>
         <a:defRPr/>
       </a:pPr>
-      <a:endParaRPr lang="ru-UA"/>
+      <a:endParaRPr lang="ru-RU"/>
     </a:p>
   </c:txPr>
   <c:externalData r:id="rId3">
@@ -850,7 +850,7 @@
 <file path=ppt/charts/chart3.xml><?xml version="1.0" encoding="utf-8"?>
 <c:chartSpace xmlns:c="http://schemas.openxmlformats.org/drawingml/2006/chart" xmlns:a="http://schemas.openxmlformats.org/drawingml/2006/main" xmlns:r="http://schemas.openxmlformats.org/officeDocument/2006/relationships" xmlns:c16r2="http://schemas.microsoft.com/office/drawing/2015/06/chart">
   <c:date1904 val="0"/>
-  <c:lang val="ru-RU"/>
+  <c:lang val="en-US"/>
   <c:roundedCorners val="0"/>
   <mc:AlternateContent xmlns:mc="http://schemas.openxmlformats.org/markup-compatibility/2006">
     <mc:Choice xmlns:c14="http://schemas.microsoft.com/office/drawing/2007/8/2/chart" Requires="c14">
@@ -899,7 +899,7 @@
               <a:cs typeface="+mn-cs"/>
             </a:defRPr>
           </a:pPr>
-          <a:endParaRPr lang="ru-UA"/>
+          <a:endParaRPr lang="ru-RU"/>
         </a:p>
       </c:txPr>
     </c:title>
@@ -1110,7 +1110,7 @@
               <a:cs typeface="+mn-cs"/>
             </a:defRPr>
           </a:pPr>
-          <a:endParaRPr lang="ru-UA"/>
+          <a:endParaRPr lang="ru-RU"/>
         </a:p>
       </c:txPr>
     </c:legend>
@@ -1139,7 +1139,7 @@
       <a:pPr>
         <a:defRPr/>
       </a:pPr>
-      <a:endParaRPr lang="ru-UA"/>
+      <a:endParaRPr lang="ru-RU"/>
     </a:p>
   </c:txPr>
   <c:externalData r:id="rId4">
@@ -1151,7 +1151,7 @@
 <file path=ppt/charts/chart4.xml><?xml version="1.0" encoding="utf-8"?>
 <c:chartSpace xmlns:c="http://schemas.openxmlformats.org/drawingml/2006/chart" xmlns:a="http://schemas.openxmlformats.org/drawingml/2006/main" xmlns:r="http://schemas.openxmlformats.org/officeDocument/2006/relationships" xmlns:c16r2="http://schemas.microsoft.com/office/drawing/2015/06/chart">
   <c:date1904 val="0"/>
-  <c:lang val="ru-RU"/>
+  <c:lang val="en-US"/>
   <c:roundedCorners val="0"/>
   <mc:AlternateContent xmlns:mc="http://schemas.openxmlformats.org/markup-compatibility/2006">
     <mc:Choice xmlns:c14="http://schemas.microsoft.com/office/drawing/2007/8/2/chart" Requires="c14">
@@ -1214,7 +1214,7 @@
               <a:cs typeface="+mn-cs"/>
             </a:defRPr>
           </a:pPr>
-          <a:endParaRPr lang="ru-UA"/>
+          <a:endParaRPr lang="ru-RU"/>
         </a:p>
       </c:txPr>
     </c:title>
@@ -1410,7 +1410,7 @@
               <a:cs typeface="+mn-cs"/>
             </a:defRPr>
           </a:pPr>
-          <a:endParaRPr lang="ru-UA"/>
+          <a:endParaRPr lang="ru-RU"/>
         </a:p>
       </c:txPr>
     </c:legend>
@@ -1441,7 +1441,7 @@
       <a:pPr>
         <a:defRPr/>
       </a:pPr>
-      <a:endParaRPr lang="ru-UA"/>
+      <a:endParaRPr lang="ru-RU"/>
     </a:p>
   </c:txPr>
   <c:externalData r:id="rId3">
@@ -1453,7 +1453,7 @@
 <file path=ppt/charts/chart5.xml><?xml version="1.0" encoding="utf-8"?>
 <c:chartSpace xmlns:c="http://schemas.openxmlformats.org/drawingml/2006/chart" xmlns:a="http://schemas.openxmlformats.org/drawingml/2006/main" xmlns:r="http://schemas.openxmlformats.org/officeDocument/2006/relationships" xmlns:c16r2="http://schemas.microsoft.com/office/drawing/2015/06/chart">
   <c:date1904 val="0"/>
-  <c:lang val="ru-RU"/>
+  <c:lang val="en-US"/>
   <c:roundedCorners val="0"/>
   <mc:AlternateContent xmlns:mc="http://schemas.openxmlformats.org/markup-compatibility/2006">
     <mc:Choice xmlns:c14="http://schemas.microsoft.com/office/drawing/2007/8/2/chart" Requires="c14">
@@ -1490,7 +1490,7 @@
               <a:cs typeface="+mn-cs"/>
             </a:defRPr>
           </a:pPr>
-          <a:endParaRPr lang="ru-UA"/>
+          <a:endParaRPr lang="ru-RU"/>
         </a:p>
       </c:txPr>
     </c:title>
@@ -1712,7 +1712,7 @@
               <a:cs typeface="+mn-cs"/>
             </a:defRPr>
           </a:pPr>
-          <a:endParaRPr lang="ru-UA"/>
+          <a:endParaRPr lang="ru-RU"/>
         </a:p>
       </c:txPr>
     </c:legend>
@@ -1743,7 +1743,7 @@
       <a:pPr>
         <a:defRPr/>
       </a:pPr>
-      <a:endParaRPr lang="ru-UA"/>
+      <a:endParaRPr lang="ru-RU"/>
     </a:p>
   </c:txPr>
   <c:externalData r:id="rId3">
@@ -1755,7 +1755,7 @@
 <file path=ppt/charts/chart6.xml><?xml version="1.0" encoding="utf-8"?>
 <c:chartSpace xmlns:c="http://schemas.openxmlformats.org/drawingml/2006/chart" xmlns:a="http://schemas.openxmlformats.org/drawingml/2006/main" xmlns:r="http://schemas.openxmlformats.org/officeDocument/2006/relationships" xmlns:c16r2="http://schemas.microsoft.com/office/drawing/2015/06/chart">
   <c:date1904 val="0"/>
-  <c:lang val="ru-RU"/>
+  <c:lang val="en-US"/>
   <c:roundedCorners val="0"/>
   <mc:AlternateContent xmlns:mc="http://schemas.openxmlformats.org/markup-compatibility/2006">
     <mc:Choice xmlns:c14="http://schemas.microsoft.com/office/drawing/2007/8/2/chart" Requires="c14">
@@ -1818,7 +1818,7 @@
               <a:cs typeface="+mn-cs"/>
             </a:defRPr>
           </a:pPr>
-          <a:endParaRPr lang="ru-UA"/>
+          <a:endParaRPr lang="ru-RU"/>
         </a:p>
       </c:txPr>
     </c:title>
@@ -2145,7 +2145,7 @@
       <a:pPr>
         <a:defRPr/>
       </a:pPr>
-      <a:endParaRPr lang="ru-UA"/>
+      <a:endParaRPr lang="ru-RU"/>
     </a:p>
   </c:txPr>
   <c:externalData r:id="rId3">
@@ -8157,7 +8157,7 @@
           <p:nvPr/>
         </p:nvPicPr>
         <p:blipFill>
-          <a:blip r:embed="rId3">
+          <a:blip r:embed="rId2">
             <a:extLst>
               <a:ext uri="{28A0092B-C50C-407E-A947-70E740481C1C}">
                 <a14:useLocalDpi xmlns:a14="http://schemas.microsoft.com/office/drawing/2010/main" val="0"/>
@@ -8206,12 +8206,12 @@
           <a:graphicData uri="http://schemas.openxmlformats.org/presentationml/2006/ole">
             <mc:AlternateContent xmlns:mc="http://schemas.openxmlformats.org/markup-compatibility/2006">
               <mc:Choice xmlns:v="urn:schemas-microsoft-com:vml" Requires="v">
-                <p:oleObj spid="_x0000_s1086" name="Document" r:id="rId4" imgW="5940848" imgH="323743" progId="Word.Document.12">
+                <p:oleObj name="Document" r:id="rId3" imgW="5940848" imgH="323743" progId="Word.Document.12">
                   <p:embed/>
                 </p:oleObj>
               </mc:Choice>
               <mc:Fallback>
-                <p:oleObj name="Document" r:id="rId4" imgW="5940848" imgH="323743" progId="Word.Document.12">
+                <p:oleObj name="Document" r:id="rId3" imgW="5940848" imgH="323743" progId="Word.Document.12">
                   <p:embed/>
                   <p:pic>
                     <p:nvPicPr>
@@ -8222,7 +8222,7 @@
                       <p:nvPr/>
                     </p:nvPicPr>
                     <p:blipFill>
-                      <a:blip r:embed="rId5">
+                      <a:blip r:embed="rId4">
                         <a:extLst>
                           <a:ext uri="{28A0092B-C50C-407E-A947-70E740481C1C}">
                             <a14:useLocalDpi xmlns:a14="http://schemas.microsoft.com/office/drawing/2010/main" val="0"/>
@@ -8311,12 +8311,12 @@
           <a:graphicData uri="http://schemas.openxmlformats.org/presentationml/2006/ole">
             <mc:AlternateContent xmlns:mc="http://schemas.openxmlformats.org/markup-compatibility/2006">
               <mc:Choice xmlns:v="urn:schemas-microsoft-com:vml" Requires="v">
-                <p:oleObj spid="_x0000_s1087" name="Packager Shell Object" showAsIcon="1" r:id="rId6" imgW="485640" imgH="372960" progId="Package">
+                <p:oleObj name="Packager Shell Object" showAsIcon="1" r:id="rId5" imgW="485640" imgH="372960" progId="Package">
                   <p:embed/>
                 </p:oleObj>
               </mc:Choice>
               <mc:Fallback>
-                <p:oleObj name="Packager Shell Object" showAsIcon="1" r:id="rId6" imgW="485640" imgH="372960" progId="Package">
+                <p:oleObj name="Packager Shell Object" showAsIcon="1" r:id="rId5" imgW="485640" imgH="372960" progId="Package">
                   <p:embed/>
                   <p:pic>
                     <p:nvPicPr>
@@ -8331,7 +8331,7 @@
                       <p:nvPr/>
                     </p:nvPicPr>
                     <p:blipFill>
-                      <a:blip r:embed="rId7"/>
+                      <a:blip r:embed="rId6"/>
                       <a:stretch>
                         <a:fillRect/>
                       </a:stretch>
@@ -8897,6 +8897,78 @@
           </a:p>
         </p:txBody>
       </p:sp>
+      <p:pic>
+        <p:nvPicPr>
+          <p:cNvPr id="5" name="Picture 4" descr="A green and white sign&#10;&#10;Description automatically generated with low confidence">
+            <a:extLst>
+              <a:ext uri="{FF2B5EF4-FFF2-40B4-BE49-F238E27FC236}">
+                <a16:creationId xmlns:a16="http://schemas.microsoft.com/office/drawing/2014/main" id="{263A8C7A-EA90-4009-BD1D-8220FD7742B4}"/>
+              </a:ext>
+            </a:extLst>
+          </p:cNvPr>
+          <p:cNvPicPr>
+            <a:picLocks noChangeAspect="1"/>
+          </p:cNvPicPr>
+          <p:nvPr/>
+        </p:nvPicPr>
+        <p:blipFill>
+          <a:blip r:embed="rId2">
+            <a:extLst>
+              <a:ext uri="{28A0092B-C50C-407E-A947-70E740481C1C}">
+                <a14:useLocalDpi xmlns:a14="http://schemas.microsoft.com/office/drawing/2010/main" val="0"/>
+              </a:ext>
+            </a:extLst>
+          </a:blip>
+          <a:stretch>
+            <a:fillRect/>
+          </a:stretch>
+        </p:blipFill>
+        <p:spPr>
+          <a:xfrm>
+            <a:off x="3075358" y="223529"/>
+            <a:ext cx="1720007" cy="1720007"/>
+          </a:xfrm>
+          <a:prstGeom prst="rect">
+            <a:avLst/>
+          </a:prstGeom>
+        </p:spPr>
+      </p:pic>
+      <p:pic>
+        <p:nvPicPr>
+          <p:cNvPr id="6" name="Picture 5" descr="A green and white sign&#10;&#10;Description automatically generated with low confidence">
+            <a:extLst>
+              <a:ext uri="{FF2B5EF4-FFF2-40B4-BE49-F238E27FC236}">
+                <a16:creationId xmlns:a16="http://schemas.microsoft.com/office/drawing/2014/main" id="{FEAEF015-E325-4518-B2DD-46500E7051EB}"/>
+              </a:ext>
+            </a:extLst>
+          </p:cNvPr>
+          <p:cNvPicPr>
+            <a:picLocks noChangeAspect="1"/>
+          </p:cNvPicPr>
+          <p:nvPr/>
+        </p:nvPicPr>
+        <p:blipFill>
+          <a:blip r:embed="rId2">
+            <a:extLst>
+              <a:ext uri="{28A0092B-C50C-407E-A947-70E740481C1C}">
+                <a14:useLocalDpi xmlns:a14="http://schemas.microsoft.com/office/drawing/2010/main" val="0"/>
+              </a:ext>
+            </a:extLst>
+          </a:blip>
+          <a:stretch>
+            <a:fillRect/>
+          </a:stretch>
+        </p:blipFill>
+        <p:spPr>
+          <a:xfrm>
+            <a:off x="5020895" y="223529"/>
+            <a:ext cx="1720007" cy="1720007"/>
+          </a:xfrm>
+          <a:prstGeom prst="rect">
+            <a:avLst/>
+          </a:prstGeom>
+        </p:spPr>
+      </p:pic>
     </p:spTree>
     <p:extLst>
       <p:ext uri="{BB962C8B-B14F-4D97-AF65-F5344CB8AC3E}">

</xml_diff>